<commit_message>
reduce to one file and fix sill math error...
</commit_message>
<xml_diff>
--- a/build_4_future_2015.16x9.pptx
+++ b/build_4_future_2015.16x9.pptx
@@ -239,7 +239,7 @@
           <a:p>
             <a:fld id="{1DECE516-1C17-1546-97E4-DDE41D8F7F0E}" type="datetimeFigureOut">
               <a:rPr lang="en-US" smtClean="0"/>
-              <a:t>5/10/15</a:t>
+              <a:t>5/19/15</a:t>
             </a:fld>
             <a:endParaRPr lang="en-US"/>
           </a:p>
@@ -1176,7 +1176,7 @@
           <a:p>
             <a:fld id="{2AF0F996-962D-5941-8D50-A0A85C539B24}" type="datetimeFigureOut">
               <a:rPr lang="en-US" smtClean="0"/>
-              <a:t>5/10/15</a:t>
+              <a:t>5/19/15</a:t>
             </a:fld>
             <a:endParaRPr lang="en-US"/>
           </a:p>
@@ -1346,7 +1346,7 @@
           <a:p>
             <a:fld id="{2AF0F996-962D-5941-8D50-A0A85C539B24}" type="datetimeFigureOut">
               <a:rPr lang="en-US" smtClean="0"/>
-              <a:t>5/10/15</a:t>
+              <a:t>5/19/15</a:t>
             </a:fld>
             <a:endParaRPr lang="en-US"/>
           </a:p>
@@ -1526,7 +1526,7 @@
           <a:p>
             <a:fld id="{2AF0F996-962D-5941-8D50-A0A85C539B24}" type="datetimeFigureOut">
               <a:rPr lang="en-US" smtClean="0"/>
-              <a:t>5/10/15</a:t>
+              <a:t>5/19/15</a:t>
             </a:fld>
             <a:endParaRPr lang="en-US"/>
           </a:p>
@@ -1696,7 +1696,7 @@
           <a:p>
             <a:fld id="{2AF0F996-962D-5941-8D50-A0A85C539B24}" type="datetimeFigureOut">
               <a:rPr lang="en-US" smtClean="0"/>
-              <a:t>5/10/15</a:t>
+              <a:t>5/19/15</a:t>
             </a:fld>
             <a:endParaRPr lang="en-US"/>
           </a:p>
@@ -1942,7 +1942,7 @@
           <a:p>
             <a:fld id="{2AF0F996-962D-5941-8D50-A0A85C539B24}" type="datetimeFigureOut">
               <a:rPr lang="en-US" smtClean="0"/>
-              <a:t>5/10/15</a:t>
+              <a:t>5/19/15</a:t>
             </a:fld>
             <a:endParaRPr lang="en-US"/>
           </a:p>
@@ -2230,7 +2230,7 @@
           <a:p>
             <a:fld id="{2AF0F996-962D-5941-8D50-A0A85C539B24}" type="datetimeFigureOut">
               <a:rPr lang="en-US" smtClean="0"/>
-              <a:t>5/10/15</a:t>
+              <a:t>5/19/15</a:t>
             </a:fld>
             <a:endParaRPr lang="en-US"/>
           </a:p>
@@ -2652,7 +2652,7 @@
           <a:p>
             <a:fld id="{2AF0F996-962D-5941-8D50-A0A85C539B24}" type="datetimeFigureOut">
               <a:rPr lang="en-US" smtClean="0"/>
-              <a:t>5/10/15</a:t>
+              <a:t>5/19/15</a:t>
             </a:fld>
             <a:endParaRPr lang="en-US"/>
           </a:p>
@@ -2770,7 +2770,7 @@
           <a:p>
             <a:fld id="{2AF0F996-962D-5941-8D50-A0A85C539B24}" type="datetimeFigureOut">
               <a:rPr lang="en-US" smtClean="0"/>
-              <a:t>5/10/15</a:t>
+              <a:t>5/19/15</a:t>
             </a:fld>
             <a:endParaRPr lang="en-US"/>
           </a:p>
@@ -2865,7 +2865,7 @@
           <a:p>
             <a:fld id="{2AF0F996-962D-5941-8D50-A0A85C539B24}" type="datetimeFigureOut">
               <a:rPr lang="en-US" smtClean="0"/>
-              <a:t>5/10/15</a:t>
+              <a:t>5/19/15</a:t>
             </a:fld>
             <a:endParaRPr lang="en-US"/>
           </a:p>
@@ -3142,7 +3142,7 @@
           <a:p>
             <a:fld id="{2AF0F996-962D-5941-8D50-A0A85C539B24}" type="datetimeFigureOut">
               <a:rPr lang="en-US" smtClean="0"/>
-              <a:t>5/10/15</a:t>
+              <a:t>5/19/15</a:t>
             </a:fld>
             <a:endParaRPr lang="en-US"/>
           </a:p>
@@ -3395,7 +3395,7 @@
           <a:p>
             <a:fld id="{2AF0F996-962D-5941-8D50-A0A85C539B24}" type="datetimeFigureOut">
               <a:rPr lang="en-US" smtClean="0"/>
-              <a:t>5/10/15</a:t>
+              <a:t>5/19/15</a:t>
             </a:fld>
             <a:endParaRPr lang="en-US"/>
           </a:p>
@@ -3608,7 +3608,7 @@
           <a:p>
             <a:fld id="{2AF0F996-962D-5941-8D50-A0A85C539B24}" type="datetimeFigureOut">
               <a:rPr lang="en-US" smtClean="0"/>
-              <a:t>5/10/15</a:t>
+              <a:t>5/19/15</a:t>
             </a:fld>
             <a:endParaRPr lang="en-US"/>
           </a:p>
@@ -4921,8 +4921,12 @@
           <a:p>
             <a:pPr lvl="1"/>
             <a:r>
+              <a:rPr lang="en-US" smtClean="0"/>
+              <a:t>299793 </a:t>
+            </a:r>
+            <a:r>
               <a:rPr lang="en-US" dirty="0" smtClean="0"/>
-              <a:t>299792.5 km/s</a:t>
+              <a:t>km/s</a:t>
             </a:r>
           </a:p>
           <a:p>
@@ -4935,7 +4939,11 @@
             <a:pPr lvl="1"/>
             <a:r>
               <a:rPr lang="en-US" dirty="0" smtClean="0"/>
-              <a:t>455684.5 km/s</a:t>
+              <a:t>197231 </a:t>
+            </a:r>
+            <a:r>
+              <a:rPr lang="en-US" dirty="0" smtClean="0"/>
+              <a:t>km/s</a:t>
             </a:r>
           </a:p>
         </p:txBody>
@@ -5698,11 +5706,7 @@
           <a:p>
             <a:r>
               <a:rPr lang="en-US" dirty="0" smtClean="0"/>
-              <a:t>Boyd </a:t>
-            </a:r>
-            <a:r>
-              <a:rPr lang="en-US" dirty="0" smtClean="0"/>
-              <a:t>Multerer</a:t>
+              <a:t>Boyd Multerer</a:t>
             </a:r>
           </a:p>
           <a:p>

</xml_diff>